<commit_message>
Visualisering af begge på én gang
</commit_message>
<xml_diff>
--- a/SOP Præsentation.pptx
+++ b/SOP Præsentation.pptx
@@ -114,6 +114,11 @@
       </a:defRPr>
     </a:lvl9pPr>
   </p:defaultTextStyle>
+  <p:extLst>
+    <p:ext uri="{EFAFB233-063F-42B5-8137-9DF3F51BA10A}">
+      <p15:sldGuideLst xmlns:p15="http://schemas.microsoft.com/office/powerpoint/2012/main"/>
+    </p:ext>
+  </p:extLst>
 </p:presentation>
 </file>
 
@@ -264,7 +269,7 @@
           <a:p>
             <a:fld id="{28967F49-A7F6-4115-8C4C-70E45750A15E}" type="datetimeFigureOut">
               <a:rPr lang="da-DK" smtClean="0"/>
-              <a:t>11-01-2022</a:t>
+              <a:t>12-01-2022</a:t>
             </a:fld>
             <a:endParaRPr lang="da-DK"/>
           </a:p>
@@ -462,7 +467,7 @@
           <a:p>
             <a:fld id="{28967F49-A7F6-4115-8C4C-70E45750A15E}" type="datetimeFigureOut">
               <a:rPr lang="da-DK" smtClean="0"/>
-              <a:t>11-01-2022</a:t>
+              <a:t>12-01-2022</a:t>
             </a:fld>
             <a:endParaRPr lang="da-DK"/>
           </a:p>
@@ -670,7 +675,7 @@
           <a:p>
             <a:fld id="{28967F49-A7F6-4115-8C4C-70E45750A15E}" type="datetimeFigureOut">
               <a:rPr lang="da-DK" smtClean="0"/>
-              <a:t>11-01-2022</a:t>
+              <a:t>12-01-2022</a:t>
             </a:fld>
             <a:endParaRPr lang="da-DK"/>
           </a:p>
@@ -868,7 +873,7 @@
           <a:p>
             <a:fld id="{28967F49-A7F6-4115-8C4C-70E45750A15E}" type="datetimeFigureOut">
               <a:rPr lang="da-DK" smtClean="0"/>
-              <a:t>11-01-2022</a:t>
+              <a:t>12-01-2022</a:t>
             </a:fld>
             <a:endParaRPr lang="da-DK"/>
           </a:p>
@@ -1143,7 +1148,7 @@
           <a:p>
             <a:fld id="{28967F49-A7F6-4115-8C4C-70E45750A15E}" type="datetimeFigureOut">
               <a:rPr lang="da-DK" smtClean="0"/>
-              <a:t>11-01-2022</a:t>
+              <a:t>12-01-2022</a:t>
             </a:fld>
             <a:endParaRPr lang="da-DK"/>
           </a:p>
@@ -1408,7 +1413,7 @@
           <a:p>
             <a:fld id="{28967F49-A7F6-4115-8C4C-70E45750A15E}" type="datetimeFigureOut">
               <a:rPr lang="da-DK" smtClean="0"/>
-              <a:t>11-01-2022</a:t>
+              <a:t>12-01-2022</a:t>
             </a:fld>
             <a:endParaRPr lang="da-DK"/>
           </a:p>
@@ -1820,7 +1825,7 @@
           <a:p>
             <a:fld id="{28967F49-A7F6-4115-8C4C-70E45750A15E}" type="datetimeFigureOut">
               <a:rPr lang="da-DK" smtClean="0"/>
-              <a:t>11-01-2022</a:t>
+              <a:t>12-01-2022</a:t>
             </a:fld>
             <a:endParaRPr lang="da-DK"/>
           </a:p>
@@ -1961,7 +1966,7 @@
           <a:p>
             <a:fld id="{28967F49-A7F6-4115-8C4C-70E45750A15E}" type="datetimeFigureOut">
               <a:rPr lang="da-DK" smtClean="0"/>
-              <a:t>11-01-2022</a:t>
+              <a:t>12-01-2022</a:t>
             </a:fld>
             <a:endParaRPr lang="da-DK"/>
           </a:p>
@@ -2074,7 +2079,7 @@
           <a:p>
             <a:fld id="{28967F49-A7F6-4115-8C4C-70E45750A15E}" type="datetimeFigureOut">
               <a:rPr lang="da-DK" smtClean="0"/>
-              <a:t>11-01-2022</a:t>
+              <a:t>12-01-2022</a:t>
             </a:fld>
             <a:endParaRPr lang="da-DK"/>
           </a:p>
@@ -2385,7 +2390,7 @@
           <a:p>
             <a:fld id="{28967F49-A7F6-4115-8C4C-70E45750A15E}" type="datetimeFigureOut">
               <a:rPr lang="da-DK" smtClean="0"/>
-              <a:t>11-01-2022</a:t>
+              <a:t>12-01-2022</a:t>
             </a:fld>
             <a:endParaRPr lang="da-DK"/>
           </a:p>
@@ -2673,7 +2678,7 @@
           <a:p>
             <a:fld id="{28967F49-A7F6-4115-8C4C-70E45750A15E}" type="datetimeFigureOut">
               <a:rPr lang="da-DK" smtClean="0"/>
-              <a:t>11-01-2022</a:t>
+              <a:t>12-01-2022</a:t>
             </a:fld>
             <a:endParaRPr lang="da-DK"/>
           </a:p>
@@ -2914,7 +2919,7 @@
           <a:p>
             <a:fld id="{28967F49-A7F6-4115-8C4C-70E45750A15E}" type="datetimeFigureOut">
               <a:rPr lang="da-DK" smtClean="0"/>
-              <a:t>11-01-2022</a:t>
+              <a:t>12-01-2022</a:t>
             </a:fld>
             <a:endParaRPr lang="da-DK"/>
           </a:p>
@@ -3986,10 +3991,10 @@
       </p:sp>
       <p:sp>
         <p:nvSpPr>
-          <p:cNvPr id="3" name="Pladsholder til indhold 2">
-            <a:extLst>
-              <a:ext uri="{FF2B5EF4-FFF2-40B4-BE49-F238E27FC236}">
-                <a16:creationId xmlns:a16="http://schemas.microsoft.com/office/drawing/2014/main" id="{8D822177-1B7F-48D6-85F0-DE22BBB42143}"/>
+          <p:cNvPr id="6" name="Pladsholder til indhold 5">
+            <a:extLst>
+              <a:ext uri="{FF2B5EF4-FFF2-40B4-BE49-F238E27FC236}">
+                <a16:creationId xmlns:a16="http://schemas.microsoft.com/office/drawing/2014/main" id="{ECD7A5D5-6C8A-41B1-B0CE-A8A736E1872A}"/>
               </a:ext>
             </a:extLst>
           </p:cNvPr>
@@ -4190,7 +4195,7 @@
           <a:graphicData uri="http://schemas.openxmlformats.org/presentationml/2006/ole">
             <mc:AlternateContent xmlns:mc="http://schemas.openxmlformats.org/markup-compatibility/2006">
               <mc:Choice xmlns:v="urn:schemas-microsoft-com:vml" Requires="v">
-                <p:oleObj spid="_x0000_s1033" name="Document" r:id="rId3" imgW="5730832" imgH="1965402" progId="Word.OpenDocumentText.12">
+                <p:oleObj spid="_x0000_s1034" name="Document" r:id="rId3" imgW="5730832" imgH="1965402" progId="Word.OpenDocumentText.12">
                   <p:embed/>
                 </p:oleObj>
               </mc:Choice>
@@ -4497,7 +4502,7 @@
           <a:graphicData uri="http://schemas.openxmlformats.org/presentationml/2006/ole">
             <mc:AlternateContent xmlns:mc="http://schemas.openxmlformats.org/markup-compatibility/2006">
               <mc:Choice xmlns:v="urn:schemas-microsoft-com:vml" Requires="v">
-                <p:oleObj spid="_x0000_s2065" name="Document" r:id="rId3" imgW="5730832" imgH="1259660" progId="Word.OpenDocumentText.12">
+                <p:oleObj spid="_x0000_s2067" name="Document" r:id="rId3" imgW="5730832" imgH="1259660" progId="Word.OpenDocumentText.12">
                   <p:embed/>
                 </p:oleObj>
               </mc:Choice>
@@ -4579,7 +4584,7 @@
           <a:graphicData uri="http://schemas.openxmlformats.org/presentationml/2006/ole">
             <mc:AlternateContent xmlns:mc="http://schemas.openxmlformats.org/markup-compatibility/2006">
               <mc:Choice xmlns:v="urn:schemas-microsoft-com:vml" Requires="v">
-                <p:oleObj spid="_x0000_s2066" name="Document" r:id="rId5" imgW="5730832" imgH="4198387" progId="Word.OpenDocumentText.12">
+                <p:oleObj spid="_x0000_s2068" name="Document" r:id="rId5" imgW="5730832" imgH="4198387" progId="Word.OpenDocumentText.12">
                   <p:embed/>
                 </p:oleObj>
               </mc:Choice>

</xml_diff>